<commit_message>
updated review ppt and pdf
</commit_message>
<xml_diff>
--- a/review/pptx/review_1.pptx
+++ b/review/pptx/review_1.pptx
@@ -323,7 +323,7 @@
             <a:fld id="{1D8BD707-D9CF-40AE-B4C6-C98DA3205C09}" type="datetimeFigureOut">
               <a:rPr lang="en-US" smtClean="0"/>
               <a:pPr/>
-              <a:t>4/28/2025</a:t>
+              <a:t>4/29/2025</a:t>
             </a:fld>
             <a:endParaRPr lang="en-US"/>
           </a:p>
@@ -488,7 +488,7 @@
             <a:fld id="{1D8BD707-D9CF-40AE-B4C6-C98DA3205C09}" type="datetimeFigureOut">
               <a:rPr lang="en-US" smtClean="0"/>
               <a:pPr/>
-              <a:t>4/28/2025</a:t>
+              <a:t>4/29/2025</a:t>
             </a:fld>
             <a:endParaRPr lang="en-US"/>
           </a:p>
@@ -663,7 +663,7 @@
             <a:fld id="{1D8BD707-D9CF-40AE-B4C6-C98DA3205C09}" type="datetimeFigureOut">
               <a:rPr lang="en-US" smtClean="0"/>
               <a:pPr/>
-              <a:t>4/28/2025</a:t>
+              <a:t>4/29/2025</a:t>
             </a:fld>
             <a:endParaRPr lang="en-US"/>
           </a:p>
@@ -828,7 +828,7 @@
             <a:fld id="{1D8BD707-D9CF-40AE-B4C6-C98DA3205C09}" type="datetimeFigureOut">
               <a:rPr lang="en-US" smtClean="0"/>
               <a:pPr/>
-              <a:t>4/28/2025</a:t>
+              <a:t>4/29/2025</a:t>
             </a:fld>
             <a:endParaRPr lang="en-US"/>
           </a:p>
@@ -1070,7 +1070,7 @@
             <a:fld id="{1D8BD707-D9CF-40AE-B4C6-C98DA3205C09}" type="datetimeFigureOut">
               <a:rPr lang="en-US" smtClean="0"/>
               <a:pPr/>
-              <a:t>4/28/2025</a:t>
+              <a:t>4/29/2025</a:t>
             </a:fld>
             <a:endParaRPr lang="en-US"/>
           </a:p>
@@ -1352,7 +1352,7 @@
             <a:fld id="{1D8BD707-D9CF-40AE-B4C6-C98DA3205C09}" type="datetimeFigureOut">
               <a:rPr lang="en-US" smtClean="0"/>
               <a:pPr/>
-              <a:t>4/28/2025</a:t>
+              <a:t>4/29/2025</a:t>
             </a:fld>
             <a:endParaRPr lang="en-US"/>
           </a:p>
@@ -1768,7 +1768,7 @@
             <a:fld id="{1D8BD707-D9CF-40AE-B4C6-C98DA3205C09}" type="datetimeFigureOut">
               <a:rPr lang="en-US" smtClean="0"/>
               <a:pPr/>
-              <a:t>4/28/2025</a:t>
+              <a:t>4/29/2025</a:t>
             </a:fld>
             <a:endParaRPr lang="en-US"/>
           </a:p>
@@ -1882,7 +1882,7 @@
             <a:fld id="{1D8BD707-D9CF-40AE-B4C6-C98DA3205C09}" type="datetimeFigureOut">
               <a:rPr lang="en-US" smtClean="0"/>
               <a:pPr/>
-              <a:t>4/28/2025</a:t>
+              <a:t>4/29/2025</a:t>
             </a:fld>
             <a:endParaRPr lang="en-US"/>
           </a:p>
@@ -1974,7 +1974,7 @@
             <a:fld id="{1D8BD707-D9CF-40AE-B4C6-C98DA3205C09}" type="datetimeFigureOut">
               <a:rPr lang="en-US" smtClean="0"/>
               <a:pPr/>
-              <a:t>4/28/2025</a:t>
+              <a:t>4/29/2025</a:t>
             </a:fld>
             <a:endParaRPr lang="en-US"/>
           </a:p>
@@ -2246,7 +2246,7 @@
             <a:fld id="{1D8BD707-D9CF-40AE-B4C6-C98DA3205C09}" type="datetimeFigureOut">
               <a:rPr lang="en-US" smtClean="0"/>
               <a:pPr/>
-              <a:t>4/28/2025</a:t>
+              <a:t>4/29/2025</a:t>
             </a:fld>
             <a:endParaRPr lang="en-US"/>
           </a:p>
@@ -2495,7 +2495,7 @@
             <a:fld id="{1D8BD707-D9CF-40AE-B4C6-C98DA3205C09}" type="datetimeFigureOut">
               <a:rPr lang="en-US" smtClean="0"/>
               <a:pPr/>
-              <a:t>4/28/2025</a:t>
+              <a:t>4/29/2025</a:t>
             </a:fld>
             <a:endParaRPr lang="en-US"/>
           </a:p>
@@ -2703,7 +2703,7 @@
             <a:fld id="{1D8BD707-D9CF-40AE-B4C6-C98DA3205C09}" type="datetimeFigureOut">
               <a:rPr lang="en-US" smtClean="0"/>
               <a:pPr/>
-              <a:t>4/28/2025</a:t>
+              <a:t>4/29/2025</a:t>
             </a:fld>
             <a:endParaRPr lang="en-US"/>
           </a:p>
@@ -3919,7 +3919,7 @@
         <p:spPr>
           <a:xfrm>
             <a:off x="1028700" y="7207640"/>
-            <a:ext cx="11719322" cy="413385"/>
+            <a:ext cx="11719322" cy="437043"/>
           </a:xfrm>
           <a:prstGeom prst="rect">
             <a:avLst/>
@@ -3937,7 +3937,7 @@
               </a:lnSpc>
             </a:pPr>
             <a:r>
-              <a:rPr lang="en-US" sz="2399">
+              <a:rPr lang="en-US" sz="2399" dirty="0">
                 <a:solidFill>
                   <a:srgbClr val="000000"/>
                 </a:solidFill>
@@ -3946,7 +3946,7 @@
                 <a:cs typeface="Now"/>
                 <a:sym typeface="Now"/>
               </a:rPr>
-              <a:t>Enable collaboration features like presence, comments, roles, and notifications.</a:t>
+              <a:t>Enable collaboration features like presence and roles.</a:t>
             </a:r>
           </a:p>
         </p:txBody>

</xml_diff>